<commit_message>
Class System + Golem Features
- New class system. When sellecting character you can chose one of 4 classes (Avarage/Mage/Seller/Warrior)
-Each class has its own uniqe features.
*Avarage - "none"
*Mage - "Mana regeneration x1.2 and magic/spell damage x1.2"
*Seller - "All price in shop is 20 per cent lower"
*Warrior - "You can survive lethal damage and regain 50% HP (500 sec CD)"
- Add new icons (7) for Magic Spells
- Golem now can cancel you damage with 15 per cent probability and receive -20% less magic damage.
- Work on stamina system.
</commit_message>
<xml_diff>
--- a/Documents/Презентація_Терешкович_ІТ-02_ПредЗахист.pptx
+++ b/Documents/Презентація_Терешкович_ІТ-02_ПредЗахист.pptx
@@ -17090,46 +17090,11 @@
               <a:t>игр</a:t>
             </a:r>
             <a:r>
-              <a:rPr lang="uk-UA" sz="2400" dirty="0">
+              <a:rPr lang="en-US" sz="2400" dirty="0">
                 <a:latin typeface="Times New Roman" panose="02020603050405020304" pitchFamily="18" charset="0"/>
                 <a:cs typeface="Times New Roman" panose="02020603050405020304" pitchFamily="18" charset="0"/>
               </a:rPr>
-              <a:t>, </a:t>
-            </a:r>
-            <a:r>
-              <a:rPr lang="uk-UA" sz="2400" dirty="0" err="1">
-                <a:latin typeface="Times New Roman" panose="02020603050405020304" pitchFamily="18" charset="0"/>
-                <a:cs typeface="Times New Roman" panose="02020603050405020304" pitchFamily="18" charset="0"/>
-              </a:rPr>
-              <a:t>улучшение</a:t>
-            </a:r>
-            <a:r>
-              <a:rPr lang="uk-UA" sz="2400" dirty="0">
-                <a:latin typeface="Times New Roman" panose="02020603050405020304" pitchFamily="18" charset="0"/>
-                <a:cs typeface="Times New Roman" panose="02020603050405020304" pitchFamily="18" charset="0"/>
-              </a:rPr>
-              <a:t> </a:t>
-            </a:r>
-            <a:r>
-              <a:rPr lang="uk-UA" sz="2400" dirty="0" err="1">
-                <a:latin typeface="Times New Roman" panose="02020603050405020304" pitchFamily="18" charset="0"/>
-                <a:cs typeface="Times New Roman" panose="02020603050405020304" pitchFamily="18" charset="0"/>
-              </a:rPr>
-              <a:t>ши</a:t>
-            </a:r>
-            <a:r>
-              <a:rPr lang="uk-UA" sz="2400" dirty="0">
-                <a:latin typeface="Times New Roman" panose="02020603050405020304" pitchFamily="18" charset="0"/>
-                <a:cs typeface="Times New Roman" panose="02020603050405020304" pitchFamily="18" charset="0"/>
-              </a:rPr>
-              <a:t> </a:t>
-            </a:r>
-            <a:r>
-              <a:rPr lang="uk-UA" sz="2400" dirty="0" err="1">
-                <a:latin typeface="Times New Roman" panose="02020603050405020304" pitchFamily="18" charset="0"/>
-                <a:cs typeface="Times New Roman" panose="02020603050405020304" pitchFamily="18" charset="0"/>
-              </a:rPr>
-              <a:t>интелектов</a:t>
+              <a:t>)</a:t>
             </a:r>
             <a:endParaRPr sz="2400" dirty="0">
               <a:latin typeface="Times New Roman" panose="02020603050405020304" pitchFamily="18" charset="0"/>

</xml_diff>